<commit_message>
ppt changed ..more testing done on custom SA
</commit_message>
<xml_diff>
--- a/PPT/intern_final.pptx
+++ b/PPT/intern_final.pptx
@@ -29,8 +29,11 @@
   <p:notesSz cx="7010400" cy="9296400"/>
   <p:embeddedFontLst>
     <p:embeddedFont>
-      <p:font typeface="Museo Sans For Dell" panose="02000000000000000000" pitchFamily="2" charset="0"/>
-      <p:regular r:id="rId20"/>
+      <p:font typeface="Aharoni" panose="02010803020104030203" pitchFamily="2" charset="-79"/>
+      <p:bold r:id="rId20"/>
+    </p:embeddedFont>
+    <p:embeddedFont>
+      <p:font typeface="Arial Black" panose="020B0A04020102020204" pitchFamily="34" charset="0"/>
       <p:bold r:id="rId21"/>
     </p:embeddedFont>
     <p:embeddedFont>
@@ -38,24 +41,21 @@
       <p:regular r:id="rId22"/>
     </p:embeddedFont>
     <p:embeddedFont>
-      <p:font typeface="Museo For Dell" panose="02000000000000000000" pitchFamily="2" charset="0"/>
+      <p:font typeface="Museo Sans For Dell" panose="02000000000000000000" pitchFamily="2" charset="0"/>
       <p:regular r:id="rId23"/>
       <p:bold r:id="rId24"/>
     </p:embeddedFont>
     <p:embeddedFont>
-      <p:font typeface="Calibri" panose="020F0502020204030204" pitchFamily="34" charset="0"/>
+      <p:font typeface="Museo For Dell" panose="02000000000000000000" pitchFamily="2" charset="0"/>
       <p:regular r:id="rId25"/>
       <p:bold r:id="rId26"/>
-      <p:italic r:id="rId27"/>
-      <p:boldItalic r:id="rId28"/>
     </p:embeddedFont>
     <p:embeddedFont>
-      <p:font typeface="Aharoni" panose="02010803020104030203" pitchFamily="2" charset="-79"/>
-      <p:bold r:id="rId29"/>
-    </p:embeddedFont>
-    <p:embeddedFont>
-      <p:font typeface="Arial Black" panose="020B0A04020102020204" pitchFamily="34" charset="0"/>
-      <p:bold r:id="rId30"/>
+      <p:font typeface="Calibri" panose="020F0502020204030204" pitchFamily="34" charset="0"/>
+      <p:regular r:id="rId27"/>
+      <p:bold r:id="rId28"/>
+      <p:italic r:id="rId29"/>
+      <p:boldItalic r:id="rId30"/>
     </p:embeddedFont>
   </p:embeddedFontLst>
   <p:custDataLst>
@@ -188,7 +188,7 @@
   </p:defaultTextStyle>
   <p:extLst>
     <p:ext uri="{EFAFB233-063F-42B5-8137-9DF3F51BA10A}">
-      <p15:sldGuideLst xmlns="" xmlns:p15="http://schemas.microsoft.com/office/powerpoint/2012/main">
+      <p15:sldGuideLst xmlns:p15="http://schemas.microsoft.com/office/powerpoint/2012/main" xmlns="">
         <p15:guide id="1" orient="horz" pos="4111">
           <p15:clr>
             <a:srgbClr val="A4A3A4"/>
@@ -207,7 +207,7 @@
       </p15:sldGuideLst>
     </p:ext>
     <p:ext uri="{2D200454-40CA-4A62-9FC3-DE9A4176ACB9}">
-      <p15:notesGuideLst xmlns="" xmlns:p15="http://schemas.microsoft.com/office/powerpoint/2012/main">
+      <p15:notesGuideLst xmlns:p15="http://schemas.microsoft.com/office/powerpoint/2012/main" xmlns="">
         <p15:guide id="1" orient="horz" pos="2928">
           <p15:clr>
             <a:srgbClr val="A4A3A4"/>
@@ -36810,7 +36810,7 @@
         <p:spPr>
           <a:xfrm>
             <a:off x="274632" y="1205473"/>
-            <a:ext cx="4375062" cy="1246495"/>
+            <a:ext cx="4375062" cy="1015663"/>
           </a:xfrm>
           <a:prstGeom prst="rect">
             <a:avLst/>
@@ -36824,13 +36824,13 @@
           <a:lstStyle/>
           <a:p>
             <a:r>
-              <a:rPr lang="en-US" sz="1500" dirty="0">
+              <a:rPr lang="en-US" sz="1500" dirty="0" smtClean="0">
                 <a:solidFill>
                   <a:schemeClr val="bg2"/>
                 </a:solidFill>
                 <a:latin typeface="+mj-lt"/>
               </a:rPr>
-              <a:t>S</a:t>
+              <a:t>A software that analyzes the sentiment of data generated by Survey/Social Networks and creates an </a:t>
             </a:r>
             <a:r>
               <a:rPr lang="en-US" sz="1500" dirty="0" smtClean="0">
@@ -36839,16 +36839,8 @@
                 </a:solidFill>
                 <a:latin typeface="+mj-lt"/>
               </a:rPr>
-              <a:t>urvey data/Social networks - the amount of data generated is huge and manually going through is time-consuming.</a:t>
-            </a:r>
-            <a:endParaRPr lang="en-US" sz="1500" dirty="0">
-              <a:solidFill>
-                <a:schemeClr val="bg2"/>
-              </a:solidFill>
-              <a:latin typeface="+mj-lt"/>
-            </a:endParaRPr>
-          </a:p>
-          <a:p>
+              <a:t>easily interpretable </a:t>
+            </a:r>
             <a:r>
               <a:rPr lang="en-US" sz="1500" dirty="0" smtClean="0">
                 <a:solidFill>
@@ -36856,10 +36848,8 @@
                 </a:solidFill>
                 <a:latin typeface="+mj-lt"/>
               </a:rPr>
-              <a:t>Created easily interpretable representations</a:t>
-            </a:r>
-          </a:p>
-          <a:p>
+              <a:t>representation using MVC </a:t>
+            </a:r>
             <a:r>
               <a:rPr lang="en-US" sz="1500" dirty="0" smtClean="0">
                 <a:solidFill>
@@ -36867,7 +36857,7 @@
                 </a:solidFill>
                 <a:latin typeface="+mj-lt"/>
               </a:rPr>
-              <a:t>MVC Design Pattern</a:t>
+              <a:t>Design Pattern</a:t>
             </a:r>
           </a:p>
         </p:txBody>
@@ -36937,8 +36927,8 @@
         </p:nvSpPr>
         <p:spPr>
           <a:xfrm>
-            <a:off x="4945342" y="1236251"/>
-            <a:ext cx="3827325" cy="1015663"/>
+            <a:off x="4932318" y="1320889"/>
+            <a:ext cx="3827325" cy="784830"/>
           </a:xfrm>
           <a:prstGeom prst="rect">
             <a:avLst/>
@@ -36958,7 +36948,7 @@
                 </a:solidFill>
                 <a:latin typeface="+mj-lt"/>
               </a:rPr>
-              <a:t>Heat maps/graphs on product -acceptance and quality of service gives definitive idea on  areas of improvement.</a:t>
+              <a:t>Acceptance and quality of service gives definitive idea on  areas of improvement.</a:t>
             </a:r>
           </a:p>
           <a:p>
@@ -36969,7 +36959,16 @@
                 </a:solidFill>
                 <a:latin typeface="+mj-lt"/>
               </a:rPr>
-              <a:t>Higher NPS – better growth. </a:t>
+              <a:t>Higher </a:t>
+            </a:r>
+            <a:r>
+              <a:rPr lang="en-US" sz="1500" dirty="0" smtClean="0">
+                <a:solidFill>
+                  <a:schemeClr val="bg2"/>
+                </a:solidFill>
+                <a:latin typeface="+mj-lt"/>
+              </a:rPr>
+              <a:t>NPS – better growth. </a:t>
             </a:r>
           </a:p>
         </p:txBody>
@@ -37105,7 +37104,7 @@
         <p:spPr>
           <a:xfrm>
             <a:off x="280782" y="2692400"/>
-            <a:ext cx="4856168" cy="2671501"/>
+            <a:ext cx="4856168" cy="3594830"/>
           </a:xfrm>
           <a:prstGeom prst="rect">
             <a:avLst/>
@@ -37126,6 +37125,58 @@
             </a:endParaRPr>
           </a:p>
           <a:p>
+            <a:r>
+              <a:rPr lang="en-US" sz="1500" dirty="0" smtClean="0">
+                <a:solidFill>
+                  <a:schemeClr val="bg2"/>
+                </a:solidFill>
+                <a:latin typeface="+mj-lt"/>
+              </a:rPr>
+              <a:t>Product/Service specific sentiment</a:t>
+            </a:r>
+          </a:p>
+          <a:p>
+            <a:r>
+              <a:rPr lang="en-US" sz="1500" dirty="0" smtClean="0">
+                <a:solidFill>
+                  <a:schemeClr val="bg2"/>
+                </a:solidFill>
+                <a:latin typeface="+mj-lt"/>
+              </a:rPr>
+              <a:t>Heat Map (World view in single screen shot)</a:t>
+            </a:r>
+          </a:p>
+          <a:p>
+            <a:r>
+              <a:rPr lang="en-US" sz="1500" dirty="0" smtClean="0">
+                <a:solidFill>
+                  <a:schemeClr val="bg2"/>
+                </a:solidFill>
+                <a:latin typeface="+mj-lt"/>
+              </a:rPr>
+              <a:t>Increased speed when using market-sentiment analyzer libraries</a:t>
+            </a:r>
+          </a:p>
+          <a:p>
+            <a:r>
+              <a:rPr lang="en-US" sz="1500" dirty="0" smtClean="0">
+                <a:solidFill>
+                  <a:schemeClr val="bg2"/>
+                </a:solidFill>
+                <a:latin typeface="+mj-lt"/>
+              </a:rPr>
+              <a:t>User-friendly UI </a:t>
+            </a:r>
+          </a:p>
+          <a:p>
+            <a:endParaRPr lang="en-US" sz="1500" dirty="0" smtClean="0">
+              <a:solidFill>
+                <a:schemeClr val="bg2"/>
+              </a:solidFill>
+              <a:latin typeface="+mj-lt"/>
+            </a:endParaRPr>
+          </a:p>
+          <a:p>
             <a:endParaRPr lang="en-US" sz="1500" dirty="0">
               <a:solidFill>
                 <a:schemeClr val="bg2"/>
@@ -37134,6 +37185,14 @@
             </a:endParaRPr>
           </a:p>
           <a:p>
+            <a:r>
+              <a:rPr lang="en-US" sz="1500" dirty="0" smtClean="0">
+                <a:solidFill>
+                  <a:schemeClr val="bg2"/>
+                </a:solidFill>
+              </a:rPr>
+              <a:t>Lexicon-based custom Sentiment Analyzer :</a:t>
+            </a:r>
             <a:endParaRPr lang="en-US" sz="1500" dirty="0" smtClean="0">
               <a:solidFill>
                 <a:schemeClr val="bg2"/>
@@ -37142,14 +37201,24 @@
             </a:endParaRPr>
           </a:p>
           <a:p>
-            <a:endParaRPr lang="en-US" sz="1500" dirty="0">
-              <a:solidFill>
-                <a:schemeClr val="bg2"/>
-              </a:solidFill>
-              <a:latin typeface="+mj-lt"/>
-            </a:endParaRPr>
-          </a:p>
-          <a:p>
+            <a:r>
+              <a:rPr lang="en-US" sz="1500" dirty="0" smtClean="0">
+                <a:solidFill>
+                  <a:schemeClr val="bg2"/>
+                </a:solidFill>
+              </a:rPr>
+              <a:t>Dell Specific dictionary</a:t>
+            </a:r>
+          </a:p>
+          <a:p>
+            <a:r>
+              <a:rPr lang="en-US" sz="1500" dirty="0">
+                <a:solidFill>
+                  <a:schemeClr val="bg2"/>
+                </a:solidFill>
+              </a:rPr>
+              <a:t>Internet slangs and Emoticons considered </a:t>
+            </a:r>
             <a:endParaRPr lang="en-US" sz="1500" dirty="0" smtClean="0">
               <a:solidFill>
                 <a:schemeClr val="bg2"/>
@@ -37165,29 +37234,20 @@
                 </a:solidFill>
                 <a:latin typeface="+mj-lt"/>
               </a:rPr>
-              <a:t>All </a:t>
-            </a:r>
-            <a:r>
-              <a:rPr lang="en-US" sz="1500" dirty="0">
+              <a:t>Intensifiers,  Negation and All capital words</a:t>
+            </a:r>
+          </a:p>
+          <a:p>
+            <a:r>
+              <a:rPr lang="en-US" sz="1500" dirty="0" smtClean="0">
                 <a:solidFill>
                   <a:schemeClr val="bg2"/>
                 </a:solidFill>
                 <a:latin typeface="+mj-lt"/>
               </a:rPr>
-              <a:t>Capitals word has more weight</a:t>
-            </a:r>
-          </a:p>
-          <a:p>
-            <a:r>
-              <a:rPr lang="en-US" sz="1500" dirty="0" smtClean="0">
-                <a:solidFill>
-                  <a:schemeClr val="bg2"/>
-                </a:solidFill>
-                <a:latin typeface="+mj-lt"/>
-              </a:rPr>
-              <a:t>Intensifiers, Lexicon-based</a:t>
-            </a:r>
-            <a:endParaRPr lang="en-US" sz="1500" dirty="0">
+              <a:t>Purity Index  - an indicator of Sarcasm.</a:t>
+            </a:r>
+            <a:endParaRPr lang="en-US" sz="1500" dirty="0" smtClean="0">
               <a:solidFill>
                 <a:schemeClr val="bg2"/>
               </a:solidFill>
@@ -37195,38 +37255,6 @@
             </a:endParaRPr>
           </a:p>
           <a:p>
-            <a:r>
-              <a:rPr lang="en-US" sz="1500" dirty="0">
-                <a:solidFill>
-                  <a:schemeClr val="bg2"/>
-                </a:solidFill>
-                <a:latin typeface="+mj-lt"/>
-              </a:rPr>
-              <a:t>Internet slangs and Emoticons considered </a:t>
-            </a:r>
-          </a:p>
-          <a:p>
-            <a:pPr>
-              <a:buClr>
-                <a:schemeClr val="accent4"/>
-              </a:buClr>
-            </a:pPr>
-            <a:r>
-              <a:rPr lang="en-US" sz="1500" dirty="0" smtClean="0">
-                <a:solidFill>
-                  <a:schemeClr val="bg2"/>
-                </a:solidFill>
-                <a:latin typeface="+mj-lt"/>
-              </a:rPr>
-              <a:t>Dell Specific dictionary, Heat Maps, Graphs</a:t>
-            </a:r>
-          </a:p>
-          <a:p>
-            <a:pPr>
-              <a:buClr>
-                <a:schemeClr val="accent4"/>
-              </a:buClr>
-            </a:pPr>
             <a:endParaRPr lang="en-US" sz="1500" dirty="0">
               <a:solidFill>
                 <a:schemeClr val="bg2"/>
@@ -37267,7 +37295,7 @@
         <p:spPr>
           <a:xfrm>
             <a:off x="5575300" y="2794000"/>
-            <a:ext cx="3197367" cy="3363998"/>
+            <a:ext cx="3197367" cy="3133165"/>
           </a:xfrm>
           <a:prstGeom prst="rect">
             <a:avLst/>
@@ -37287,17 +37315,19 @@
                 </a:solidFill>
                 <a:latin typeface="+mj-lt"/>
               </a:rPr>
-              <a:t>Noun-</a:t>
-            </a:r>
-            <a:r>
-              <a:rPr lang="en-US" sz="1500" dirty="0" err="1" smtClean="0">
+              <a:t>Heat </a:t>
+            </a:r>
+            <a:r>
+              <a:rPr lang="en-US" sz="1500" dirty="0" smtClean="0">
                 <a:solidFill>
                   <a:schemeClr val="bg2"/>
                 </a:solidFill>
                 <a:latin typeface="+mj-lt"/>
               </a:rPr>
-              <a:t>Adj</a:t>
-            </a:r>
+              <a:t>Map ad Graphs on a Keyword Basis.</a:t>
+            </a:r>
+          </a:p>
+          <a:p>
             <a:r>
               <a:rPr lang="en-US" sz="1500" dirty="0" smtClean="0">
                 <a:solidFill>
@@ -37305,59 +37335,16 @@
                 </a:solidFill>
                 <a:latin typeface="+mj-lt"/>
               </a:rPr>
-              <a:t>-Verb </a:t>
-            </a:r>
-            <a:r>
-              <a:rPr lang="en-US" sz="1500" dirty="0">
-                <a:solidFill>
-                  <a:schemeClr val="bg2"/>
-                </a:solidFill>
-                <a:latin typeface="+mj-lt"/>
-              </a:rPr>
-              <a:t>relation has scope to improve</a:t>
-            </a:r>
-          </a:p>
-          <a:p>
-            <a:r>
-              <a:rPr lang="en-US" sz="1500" dirty="0">
-                <a:solidFill>
-                  <a:schemeClr val="bg2"/>
-                </a:solidFill>
-                <a:latin typeface="+mj-lt"/>
-              </a:rPr>
-              <a:t>Conjunction testing   </a:t>
-            </a:r>
-          </a:p>
-          <a:p>
-            <a:r>
-              <a:rPr lang="en-US" sz="1500" dirty="0">
-                <a:solidFill>
-                  <a:schemeClr val="bg2"/>
-                </a:solidFill>
-                <a:latin typeface="+mj-lt"/>
-              </a:rPr>
-              <a:t>Using Maximum Entropy Classifiers</a:t>
-            </a:r>
-          </a:p>
-          <a:p>
-            <a:r>
-              <a:rPr lang="en-US" sz="1500" dirty="0">
-                <a:solidFill>
-                  <a:schemeClr val="bg2"/>
-                </a:solidFill>
-                <a:latin typeface="+mj-lt"/>
-              </a:rPr>
-              <a:t>Performance </a:t>
-            </a:r>
-            <a:r>
-              <a:rPr lang="en-US" sz="1500" dirty="0" smtClean="0">
-                <a:solidFill>
-                  <a:schemeClr val="bg2"/>
-                </a:solidFill>
-                <a:latin typeface="+mj-lt"/>
-              </a:rPr>
-              <a:t>improvement.</a:t>
-            </a:r>
+              <a:t>Search Feature displays Heat Map and Graphs</a:t>
+            </a:r>
+          </a:p>
+          <a:p>
+            <a:endParaRPr lang="en-US" sz="1500" dirty="0" smtClean="0">
+              <a:solidFill>
+                <a:schemeClr val="bg2"/>
+              </a:solidFill>
+              <a:latin typeface="+mj-lt"/>
+            </a:endParaRPr>
           </a:p>
           <a:p>
             <a:endParaRPr lang="en-US" sz="1500" dirty="0">
@@ -37369,24 +37356,48 @@
           </a:p>
           <a:p>
             <a:r>
-              <a:rPr lang="en-US" sz="1500" dirty="0" smtClean="0">
+              <a:rPr lang="en-US" sz="1500" dirty="0">
                 <a:solidFill>
                   <a:schemeClr val="bg2"/>
                 </a:solidFill>
-                <a:latin typeface="+mj-lt"/>
               </a:rPr>
-              <a:t>Heat Map ad Graphs on a Keyword Basis.</a:t>
-            </a:r>
-          </a:p>
-          <a:p>
-            <a:r>
-              <a:rPr lang="en-US" sz="1500" dirty="0" smtClean="0">
+              <a:t>Noun-</a:t>
+            </a:r>
+            <a:r>
+              <a:rPr lang="en-US" sz="1500" dirty="0" err="1">
                 <a:solidFill>
                   <a:schemeClr val="bg2"/>
                 </a:solidFill>
-                <a:latin typeface="+mj-lt"/>
               </a:rPr>
-              <a:t>Search Feature displays Heat Map and Graphs</a:t>
+              <a:t>Adj</a:t>
+            </a:r>
+            <a:r>
+              <a:rPr lang="en-US" sz="1500" dirty="0">
+                <a:solidFill>
+                  <a:schemeClr val="bg2"/>
+                </a:solidFill>
+              </a:rPr>
+              <a:t>-Verb relation has scope to improve</a:t>
+            </a:r>
+          </a:p>
+          <a:p>
+            <a:r>
+              <a:rPr lang="en-US" sz="1500" dirty="0">
+                <a:solidFill>
+                  <a:schemeClr val="bg2"/>
+                </a:solidFill>
+              </a:rPr>
+              <a:t>Conjunction testing</a:t>
+            </a:r>
+          </a:p>
+          <a:p>
+            <a:r>
+              <a:rPr lang="en-US" sz="1500" dirty="0">
+                <a:solidFill>
+                  <a:schemeClr val="bg2"/>
+                </a:solidFill>
+              </a:rPr>
+              <a:t>Performance improvement.</a:t>
             </a:r>
           </a:p>
           <a:p>
@@ -38289,7 +38300,7 @@
   </a:extraClrSchemeLst>
   <a:extLst>
     <a:ext uri="{05A4C25C-085E-4340-85A3-A5531E510DB2}">
-      <thm15:themeFamily xmlns="" xmlns:thm15="http://schemas.microsoft.com/office/thememl/2012/main" name="Presentation12" id="{DAFB7478-47B3-40DE-90C0-3857378F45FF}" vid="{6E384890-8F9F-4A11-9330-31F5F14C349B}"/>
+      <thm15:themeFamily xmlns:thm15="http://schemas.microsoft.com/office/thememl/2012/main" xmlns="" name="Presentation12" id="{DAFB7478-47B3-40DE-90C0-3857378F45FF}" vid="{6E384890-8F9F-4A11-9330-31F5F14C349B}"/>
     </a:ext>
   </a:extLst>
 </a:theme>
@@ -38622,7 +38633,7 @@
   </a:extraClrSchemeLst>
   <a:extLst>
     <a:ext uri="{05A4C25C-085E-4340-85A3-A5531E510DB2}">
-      <thm15:themeFamily xmlns="" xmlns:thm15="http://schemas.microsoft.com/office/thememl/2012/main" name="Presentation12" id="{DAFB7478-47B3-40DE-90C0-3857378F45FF}" vid="{C8BAF95F-293E-49F1-9C5A-6A7DFEFCDE30}"/>
+      <thm15:themeFamily xmlns:thm15="http://schemas.microsoft.com/office/thememl/2012/main" xmlns="" name="Presentation12" id="{DAFB7478-47B3-40DE-90C0-3857378F45FF}" vid="{C8BAF95F-293E-49F1-9C5A-6A7DFEFCDE30}"/>
     </a:ext>
   </a:extLst>
 </a:theme>
@@ -39805,7 +39816,7 @@
   </a:extraClrSchemeLst>
   <a:extLst>
     <a:ext uri="{05A4C25C-085E-4340-85A3-A5531E510DB2}">
-      <thm15:themeFamily xmlns="" xmlns:thm15="http://schemas.microsoft.com/office/thememl/2012/main" name="Presentation12" id="{DAFB7478-47B3-40DE-90C0-3857378F45FF}" vid="{21BA7CA8-7620-4C1E-95A4-65CD1B58CD3B}"/>
+      <thm15:themeFamily xmlns:thm15="http://schemas.microsoft.com/office/thememl/2012/main" xmlns="" name="Presentation12" id="{DAFB7478-47B3-40DE-90C0-3857378F45FF}" vid="{21BA7CA8-7620-4C1E-95A4-65CD1B58CD3B}"/>
     </a:ext>
   </a:extLst>
 </a:theme>
@@ -40138,7 +40149,7 @@
   </a:extraClrSchemeLst>
   <a:extLst>
     <a:ext uri="{05A4C25C-085E-4340-85A3-A5531E510DB2}">
-      <thm15:themeFamily xmlns="" xmlns:thm15="http://schemas.microsoft.com/office/thememl/2012/main" name="Presentation12" id="{DAFB7478-47B3-40DE-90C0-3857378F45FF}" vid="{62936EF5-9C78-4A9F-B13F-C44543044758}"/>
+      <thm15:themeFamily xmlns:thm15="http://schemas.microsoft.com/office/thememl/2012/main" xmlns="" name="Presentation12" id="{DAFB7478-47B3-40DE-90C0-3857378F45FF}" vid="{62936EF5-9C78-4A9F-B13F-C44543044758}"/>
     </a:ext>
   </a:extLst>
 </a:theme>
@@ -40471,7 +40482,7 @@
   </a:extraClrSchemeLst>
   <a:extLst>
     <a:ext uri="{05A4C25C-085E-4340-85A3-A5531E510DB2}">
-      <thm15:themeFamily xmlns="" xmlns:thm15="http://schemas.microsoft.com/office/thememl/2012/main" name="Presentation12" id="{DAFB7478-47B3-40DE-90C0-3857378F45FF}" vid="{AF3762C5-E896-4764-88B9-1C96F93B9BCD}"/>
+      <thm15:themeFamily xmlns:thm15="http://schemas.microsoft.com/office/thememl/2012/main" xmlns="" name="Presentation12" id="{DAFB7478-47B3-40DE-90C0-3857378F45FF}" vid="{AF3762C5-E896-4764-88B9-1C96F93B9BCD}"/>
     </a:ext>
   </a:extLst>
 </a:theme>
@@ -40804,7 +40815,7 @@
   </a:extraClrSchemeLst>
   <a:extLst>
     <a:ext uri="{05A4C25C-085E-4340-85A3-A5531E510DB2}">
-      <thm15:themeFamily xmlns="" xmlns:thm15="http://schemas.microsoft.com/office/thememl/2012/main" name="Presentation12" id="{DAFB7478-47B3-40DE-90C0-3857378F45FF}" vid="{113EF733-E79B-44B7-BFB7-3203CC8C70D7}"/>
+      <thm15:themeFamily xmlns:thm15="http://schemas.microsoft.com/office/thememl/2012/main" xmlns="" name="Presentation12" id="{DAFB7478-47B3-40DE-90C0-3857378F45FF}" vid="{113EF733-E79B-44B7-BFB7-3203CC8C70D7}"/>
     </a:ext>
   </a:extLst>
 </a:theme>
@@ -41137,7 +41148,7 @@
   </a:extraClrSchemeLst>
   <a:extLst>
     <a:ext uri="{05A4C25C-085E-4340-85A3-A5531E510DB2}">
-      <thm15:themeFamily xmlns="" xmlns:thm15="http://schemas.microsoft.com/office/thememl/2012/main" name="Presentation12" id="{DAFB7478-47B3-40DE-90C0-3857378F45FF}" vid="{5C4A94E3-FA97-42A4-BA2D-437C73A6F7E5}"/>
+      <thm15:themeFamily xmlns:thm15="http://schemas.microsoft.com/office/thememl/2012/main" xmlns="" name="Presentation12" id="{DAFB7478-47B3-40DE-90C0-3857378F45FF}" vid="{5C4A94E3-FA97-42A4-BA2D-437C73A6F7E5}"/>
     </a:ext>
   </a:extLst>
 </a:theme>
@@ -41470,7 +41481,7 @@
   </a:extraClrSchemeLst>
   <a:extLst>
     <a:ext uri="{05A4C25C-085E-4340-85A3-A5531E510DB2}">
-      <thm15:themeFamily xmlns="" xmlns:thm15="http://schemas.microsoft.com/office/thememl/2012/main" name="Presentation12" id="{DAFB7478-47B3-40DE-90C0-3857378F45FF}" vid="{61C20380-6C7B-4A01-A2EA-DEBD17F86DFB}"/>
+      <thm15:themeFamily xmlns:thm15="http://schemas.microsoft.com/office/thememl/2012/main" xmlns="" name="Presentation12" id="{DAFB7478-47B3-40DE-90C0-3857378F45FF}" vid="{61C20380-6C7B-4A01-A2EA-DEBD17F86DFB}"/>
     </a:ext>
   </a:extLst>
 </a:theme>
@@ -41803,7 +41814,7 @@
   </a:extraClrSchemeLst>
   <a:extLst>
     <a:ext uri="{05A4C25C-085E-4340-85A3-A5531E510DB2}">
-      <thm15:themeFamily xmlns="" xmlns:thm15="http://schemas.microsoft.com/office/thememl/2012/main" name="Presentation12" id="{DAFB7478-47B3-40DE-90C0-3857378F45FF}" vid="{C05AC854-A408-4B81-86C9-67883E0C9BF8}"/>
+      <thm15:themeFamily xmlns:thm15="http://schemas.microsoft.com/office/thememl/2012/main" xmlns="" name="Presentation12" id="{DAFB7478-47B3-40DE-90C0-3857378F45FF}" vid="{C05AC854-A408-4B81-86C9-67883E0C9BF8}"/>
     </a:ext>
   </a:extLst>
 </a:theme>
@@ -42136,16 +42147,19 @@
   </a:extraClrSchemeLst>
   <a:extLst>
     <a:ext uri="{05A4C25C-085E-4340-85A3-A5531E510DB2}">
-      <thm15:themeFamily xmlns="" xmlns:thm15="http://schemas.microsoft.com/office/thememl/2012/main" name="Presentation12" id="{DAFB7478-47B3-40DE-90C0-3857378F45FF}" vid="{532E81F1-70E5-4D00-AE0F-456D020155FE}"/>
+      <thm15:themeFamily xmlns:thm15="http://schemas.microsoft.com/office/thememl/2012/main" xmlns="" name="Presentation12" id="{DAFB7478-47B3-40DE-90C0-3857378F45FF}" vid="{532E81F1-70E5-4D00-AE0F-456D020155FE}"/>
     </a:ext>
   </a:extLst>
 </a:theme>
 </file>
 
 <file path=customXml/item1.xml><?xml version="1.0" encoding="utf-8"?>
-<p:properties xmlns:p="http://schemas.microsoft.com/office/2006/metadata/properties" xmlns:xsi="http://www.w3.org/2001/XMLSchema-instance">
-  <documentManagement/>
-</p:properties>
+<?mso-contentType ?>
+<FormTemplates xmlns="http://schemas.microsoft.com/sharepoint/v3/contenttype/forms">
+  <Display>DocumentLibraryForm</Display>
+  <Edit>DocumentLibraryForm</Edit>
+  <New>DocumentLibraryForm</New>
+</FormTemplates>
 </file>
 
 <file path=customXml/item2.xml><?xml version="1.0" encoding="utf-8"?>
@@ -42198,24 +42212,15 @@
 </file>
 
 <file path=customXml/item3.xml><?xml version="1.0" encoding="utf-8"?>
-<?mso-contentType ?>
-<FormTemplates xmlns="http://schemas.microsoft.com/sharepoint/v3/contenttype/forms">
-  <Display>DocumentLibraryForm</Display>
-  <Edit>DocumentLibraryForm</Edit>
-  <New>DocumentLibraryForm</New>
-</FormTemplates>
+<p:properties xmlns:p="http://schemas.microsoft.com/office/2006/metadata/properties" xmlns:xsi="http://www.w3.org/2001/XMLSchema-instance">
+  <documentManagement/>
+</p:properties>
 </file>
 
 <file path=customXml/itemProps1.xml><?xml version="1.0" encoding="utf-8"?>
-<ds:datastoreItem xmlns:ds="http://schemas.openxmlformats.org/officeDocument/2006/customXml" ds:itemID="{0873BDD3-AA35-4F19-A12A-C6462BECFBD1}">
+<ds:datastoreItem xmlns:ds="http://schemas.openxmlformats.org/officeDocument/2006/customXml" ds:itemID="{86FC490B-1F77-48C5-AC70-1DD939DBDF04}">
   <ds:schemaRefs>
-    <ds:schemaRef ds:uri="http://purl.org/dc/dcmitype/"/>
-    <ds:schemaRef ds:uri="http://www.w3.org/XML/1998/namespace"/>
-    <ds:schemaRef ds:uri="http://schemas.microsoft.com/office/2006/documentManagement/types"/>
-    <ds:schemaRef ds:uri="http://purl.org/dc/elements/1.1/"/>
-    <ds:schemaRef ds:uri="http://schemas.openxmlformats.org/package/2006/metadata/core-properties"/>
-    <ds:schemaRef ds:uri="http://schemas.microsoft.com/office/2006/metadata/properties"/>
-    <ds:schemaRef ds:uri="http://purl.org/dc/terms/"/>
+    <ds:schemaRef ds:uri="http://schemas.microsoft.com/sharepoint/v3/contenttype/forms"/>
   </ds:schemaRefs>
 </ds:datastoreItem>
 </file>
@@ -42236,9 +42241,15 @@
 </file>
 
 <file path=customXml/itemProps3.xml><?xml version="1.0" encoding="utf-8"?>
-<ds:datastoreItem xmlns:ds="http://schemas.openxmlformats.org/officeDocument/2006/customXml" ds:itemID="{86FC490B-1F77-48C5-AC70-1DD939DBDF04}">
+<ds:datastoreItem xmlns:ds="http://schemas.openxmlformats.org/officeDocument/2006/customXml" ds:itemID="{0873BDD3-AA35-4F19-A12A-C6462BECFBD1}">
   <ds:schemaRefs>
-    <ds:schemaRef ds:uri="http://schemas.microsoft.com/sharepoint/v3/contenttype/forms"/>
+    <ds:schemaRef ds:uri="http://purl.org/dc/dcmitype/"/>
+    <ds:schemaRef ds:uri="http://www.w3.org/XML/1998/namespace"/>
+    <ds:schemaRef ds:uri="http://schemas.microsoft.com/office/2006/documentManagement/types"/>
+    <ds:schemaRef ds:uri="http://purl.org/dc/elements/1.1/"/>
+    <ds:schemaRef ds:uri="http://schemas.openxmlformats.org/package/2006/metadata/core-properties"/>
+    <ds:schemaRef ds:uri="http://schemas.microsoft.com/office/2006/metadata/properties"/>
+    <ds:schemaRef ds:uri="http://purl.org/dc/terms/"/>
   </ds:schemaRefs>
 </ds:datastoreItem>
 </file>
</xml_diff>